<commit_message>
Fix result text in overview inside pptx
</commit_message>
<xml_diff>
--- a/presentation.pptx
+++ b/presentation.pptx
@@ -106,6 +106,11 @@
       </a:defRPr>
     </a:lvl9pPr>
   </p:defaultTextStyle>
+  <p:extLst>
+    <p:ext uri="{EFAFB233-063F-42B5-8137-9DF3F51BA10A}">
+      <p15:sldGuideLst xmlns:p15="http://schemas.microsoft.com/office/powerpoint/2012/main"/>
+    </p:ext>
+  </p:extLst>
 </p:presentation>
 </file>
 
@@ -6108,7 +6113,15 @@
             <a:pPr marL="699750" lvl="1" indent="-285750"/>
             <a:r>
               <a:rPr lang="en-GB" dirty="0"/>
-              <a:t>Target: Binary classification (Home Win vs. Not Home Win)</a:t>
+              <a:t>Target: Binary classification (Home Win vs. </a:t>
+            </a:r>
+            <a:r>
+              <a:rPr lang="en-GB"/>
+              <a:t>Away Win</a:t>
+            </a:r>
+            <a:r>
+              <a:rPr lang="en-GB" dirty="0"/>
+              <a:t>)</a:t>
             </a:r>
           </a:p>
           <a:p>

</xml_diff>